<commit_message>
worked on a bunch of claims poerpoints
</commit_message>
<xml_diff>
--- a/PowerPoints/Phase 3 - Claims Terminology/010 Claims vs Claim Lines.pptx
+++ b/PowerPoints/Phase 3 - Claims Terminology/010 Claims vs Claim Lines.pptx
@@ -8,6 +8,9 @@
   <p:sldIdLst>
     <p:sldId id="256" r:id="rId3"/>
     <p:sldId id="257" r:id="rId4"/>
+    <p:sldId id="258" r:id="rId5"/>
+    <p:sldId id="259" r:id="rId6"/>
+    <p:sldId id="260" r:id="rId7"/>
   </p:sldIdLst>
   <p:sldSz cx="12192000" cy="6858000"/>
   <p:notesSz cx="6858000" cy="9144000"/>
@@ -251,7 +254,7 @@
           <a:p>
             <a:fld id="{FF632088-7E42-4B13-8645-6CA4616862AF}" type="datetimeFigureOut">
               <a:rPr lang="en-US" smtClean="0"/>
-              <a:t>2/22/2016</a:t>
+              <a:t>3/2/2016</a:t>
             </a:fld>
             <a:endParaRPr lang="en-US"/>
           </a:p>
@@ -421,7 +424,7 @@
           <a:p>
             <a:fld id="{FF632088-7E42-4B13-8645-6CA4616862AF}" type="datetimeFigureOut">
               <a:rPr lang="en-US" smtClean="0"/>
-              <a:t>2/22/2016</a:t>
+              <a:t>3/2/2016</a:t>
             </a:fld>
             <a:endParaRPr lang="en-US"/>
           </a:p>
@@ -601,7 +604,7 @@
           <a:p>
             <a:fld id="{FF632088-7E42-4B13-8645-6CA4616862AF}" type="datetimeFigureOut">
               <a:rPr lang="en-US" smtClean="0"/>
-              <a:t>2/22/2016</a:t>
+              <a:t>3/2/2016</a:t>
             </a:fld>
             <a:endParaRPr lang="en-US"/>
           </a:p>
@@ -801,7 +804,7 @@
           <a:p>
             <a:fld id="{FF632088-7E42-4B13-8645-6CA4616862AF}" type="datetimeFigureOut">
               <a:rPr lang="en-US" smtClean="0"/>
-              <a:t>2/22/2016</a:t>
+              <a:t>3/2/2016</a:t>
             </a:fld>
             <a:endParaRPr lang="en-US"/>
           </a:p>
@@ -1018,7 +1021,7 @@
           <a:p>
             <a:fld id="{FF632088-7E42-4B13-8645-6CA4616862AF}" type="datetimeFigureOut">
               <a:rPr lang="en-US" smtClean="0"/>
-              <a:t>2/22/2016</a:t>
+              <a:t>3/2/2016</a:t>
             </a:fld>
             <a:endParaRPr lang="en-US"/>
           </a:p>
@@ -1303,7 +1306,7 @@
           <a:p>
             <a:fld id="{FF632088-7E42-4B13-8645-6CA4616862AF}" type="datetimeFigureOut">
               <a:rPr lang="en-US" smtClean="0"/>
-              <a:t>2/22/2016</a:t>
+              <a:t>3/2/2016</a:t>
             </a:fld>
             <a:endParaRPr lang="en-US"/>
           </a:p>
@@ -1577,7 +1580,7 @@
           <a:p>
             <a:fld id="{FF632088-7E42-4B13-8645-6CA4616862AF}" type="datetimeFigureOut">
               <a:rPr lang="en-US" smtClean="0"/>
-              <a:t>2/22/2016</a:t>
+              <a:t>3/2/2016</a:t>
             </a:fld>
             <a:endParaRPr lang="en-US"/>
           </a:p>
@@ -1674,7 +1677,7 @@
   </p:clrMapOvr>
   <p:extLst>
     <p:ext uri="{DCECCB84-F9BA-43D5-87BE-67443E8EF086}">
-      <p15:sldGuideLst xmlns:p15="http://schemas.microsoft.com/office/powerpoint/2012/main" xmlns=""/>
+      <p15:sldGuideLst xmlns="" xmlns:p15="http://schemas.microsoft.com/office/powerpoint/2012/main"/>
     </p:ext>
   </p:extLst>
 </p:sldLayout>
@@ -2004,7 +2007,7 @@
           <a:p>
             <a:fld id="{FF632088-7E42-4B13-8645-6CA4616862AF}" type="datetimeFigureOut">
               <a:rPr lang="en-US" smtClean="0"/>
-              <a:t>2/22/2016</a:t>
+              <a:t>3/2/2016</a:t>
             </a:fld>
             <a:endParaRPr lang="en-US"/>
           </a:p>
@@ -2101,7 +2104,7 @@
   </p:clrMapOvr>
   <p:extLst>
     <p:ext uri="{DCECCB84-F9BA-43D5-87BE-67443E8EF086}">
-      <p15:sldGuideLst xmlns:p15="http://schemas.microsoft.com/office/powerpoint/2012/main" xmlns=""/>
+      <p15:sldGuideLst xmlns="" xmlns:p15="http://schemas.microsoft.com/office/powerpoint/2012/main"/>
     </p:ext>
   </p:extLst>
 </p:sldLayout>
@@ -2164,7 +2167,7 @@
           <a:p>
             <a:fld id="{FF632088-7E42-4B13-8645-6CA4616862AF}" type="datetimeFigureOut">
               <a:rPr lang="en-US" smtClean="0"/>
-              <a:t>2/22/2016</a:t>
+              <a:t>3/2/2016</a:t>
             </a:fld>
             <a:endParaRPr lang="en-US"/>
           </a:p>
@@ -2296,7 +2299,7 @@
           <a:p>
             <a:fld id="{FF632088-7E42-4B13-8645-6CA4616862AF}" type="datetimeFigureOut">
               <a:rPr lang="en-US" smtClean="0"/>
-              <a:t>2/22/2016</a:t>
+              <a:t>3/2/2016</a:t>
             </a:fld>
             <a:endParaRPr lang="en-US"/>
           </a:p>
@@ -2547,7 +2550,7 @@
           <a:p>
             <a:fld id="{FF632088-7E42-4B13-8645-6CA4616862AF}" type="datetimeFigureOut">
               <a:rPr lang="en-US" smtClean="0"/>
-              <a:t>2/22/2016</a:t>
+              <a:t>3/2/2016</a:t>
             </a:fld>
             <a:endParaRPr lang="en-US"/>
           </a:p>
@@ -2644,7 +2647,7 @@
   </p:clrMapOvr>
   <p:extLst>
     <p:ext uri="{DCECCB84-F9BA-43D5-87BE-67443E8EF086}">
-      <p15:sldGuideLst xmlns:p15="http://schemas.microsoft.com/office/powerpoint/2012/main" xmlns=""/>
+      <p15:sldGuideLst xmlns="" xmlns:p15="http://schemas.microsoft.com/office/powerpoint/2012/main"/>
     </p:ext>
   </p:extLst>
 </p:sldLayout>
@@ -2759,7 +2762,7 @@
           <a:p>
             <a:fld id="{FF632088-7E42-4B13-8645-6CA4616862AF}" type="datetimeFigureOut">
               <a:rPr lang="en-US" smtClean="0"/>
-              <a:t>2/22/2016</a:t>
+              <a:t>3/2/2016</a:t>
             </a:fld>
             <a:endParaRPr lang="en-US"/>
           </a:p>
@@ -3177,7 +3180,7 @@
           <a:p>
             <a:fld id="{FF632088-7E42-4B13-8645-6CA4616862AF}" type="datetimeFigureOut">
               <a:rPr lang="en-US" smtClean="0"/>
-              <a:t>2/22/2016</a:t>
+              <a:t>3/2/2016</a:t>
             </a:fld>
             <a:endParaRPr lang="en-US"/>
           </a:p>
@@ -3389,7 +3392,7 @@
           <a:p>
             <a:fld id="{FF632088-7E42-4B13-8645-6CA4616862AF}" type="datetimeFigureOut">
               <a:rPr lang="en-US" smtClean="0"/>
-              <a:t>2/22/2016</a:t>
+              <a:t>3/2/2016</a:t>
             </a:fld>
             <a:endParaRPr lang="en-US"/>
           </a:p>
@@ -3610,7 +3613,7 @@
           <a:p>
             <a:fld id="{FF632088-7E42-4B13-8645-6CA4616862AF}" type="datetimeFigureOut">
               <a:rPr lang="en-US" smtClean="0"/>
-              <a:t>2/22/2016</a:t>
+              <a:t>3/2/2016</a:t>
             </a:fld>
             <a:endParaRPr lang="en-US"/>
           </a:p>
@@ -3898,7 +3901,7 @@
           <a:p>
             <a:fld id="{FF632088-7E42-4B13-8645-6CA4616862AF}" type="datetimeFigureOut">
               <a:rPr lang="en-US" smtClean="0"/>
-              <a:t>2/22/2016</a:t>
+              <a:t>3/2/2016</a:t>
             </a:fld>
             <a:endParaRPr lang="en-US"/>
           </a:p>
@@ -4130,7 +4133,7 @@
           <a:p>
             <a:fld id="{FF632088-7E42-4B13-8645-6CA4616862AF}" type="datetimeFigureOut">
               <a:rPr lang="en-US" smtClean="0"/>
-              <a:t>2/22/2016</a:t>
+              <a:t>3/2/2016</a:t>
             </a:fld>
             <a:endParaRPr lang="en-US"/>
           </a:p>
@@ -4190,7 +4193,7 @@
   </p:clrMapOvr>
   <p:extLst>
     <p:ext uri="{DCECCB84-F9BA-43D5-87BE-67443E8EF086}">
-      <p15:sldGuideLst xmlns:p15="http://schemas.microsoft.com/office/powerpoint/2012/main" xmlns=""/>
+      <p15:sldGuideLst xmlns="" xmlns:p15="http://schemas.microsoft.com/office/powerpoint/2012/main"/>
     </p:ext>
   </p:extLst>
 </p:sldLayout>
@@ -4482,7 +4485,7 @@
           <a:p>
             <a:fld id="{FF632088-7E42-4B13-8645-6CA4616862AF}" type="datetimeFigureOut">
               <a:rPr lang="en-US" smtClean="0"/>
-              <a:t>2/22/2016</a:t>
+              <a:t>3/2/2016</a:t>
             </a:fld>
             <a:endParaRPr lang="en-US"/>
           </a:p>
@@ -4565,7 +4568,7 @@
   </p:clrMapOvr>
   <p:extLst>
     <p:ext uri="{DCECCB84-F9BA-43D5-87BE-67443E8EF086}">
-      <p15:sldGuideLst xmlns:p15="http://schemas.microsoft.com/office/powerpoint/2012/main" xmlns=""/>
+      <p15:sldGuideLst xmlns="" xmlns:p15="http://schemas.microsoft.com/office/powerpoint/2012/main"/>
     </p:ext>
   </p:extLst>
 </p:sldLayout>
@@ -4605,7 +4608,7 @@
           <a:p>
             <a:fld id="{FF632088-7E42-4B13-8645-6CA4616862AF}" type="datetimeFigureOut">
               <a:rPr lang="en-US" smtClean="0"/>
-              <a:t>2/22/2016</a:t>
+              <a:t>3/2/2016</a:t>
             </a:fld>
             <a:endParaRPr lang="en-US"/>
           </a:p>
@@ -4723,7 +4726,7 @@
           <a:p>
             <a:fld id="{FF632088-7E42-4B13-8645-6CA4616862AF}" type="datetimeFigureOut">
               <a:rPr lang="en-US" smtClean="0"/>
-              <a:t>2/22/2016</a:t>
+              <a:t>3/2/2016</a:t>
             </a:fld>
             <a:endParaRPr lang="en-US"/>
           </a:p>
@@ -5007,7 +5010,7 @@
           <a:p>
             <a:fld id="{FF632088-7E42-4B13-8645-6CA4616862AF}" type="datetimeFigureOut">
               <a:rPr lang="en-US" smtClean="0"/>
-              <a:t>2/22/2016</a:t>
+              <a:t>3/2/2016</a:t>
             </a:fld>
             <a:endParaRPr lang="en-US"/>
           </a:p>
@@ -5067,7 +5070,7 @@
   </p:clrMapOvr>
   <p:extLst>
     <p:ext uri="{DCECCB84-F9BA-43D5-87BE-67443E8EF086}">
-      <p15:sldGuideLst xmlns:p15="http://schemas.microsoft.com/office/powerpoint/2012/main" xmlns=""/>
+      <p15:sldGuideLst xmlns="" xmlns:p15="http://schemas.microsoft.com/office/powerpoint/2012/main"/>
     </p:ext>
   </p:extLst>
 </p:sldLayout>
@@ -5276,7 +5279,7 @@
           <a:p>
             <a:fld id="{FF632088-7E42-4B13-8645-6CA4616862AF}" type="datetimeFigureOut">
               <a:rPr lang="en-US" smtClean="0"/>
-              <a:t>2/22/2016</a:t>
+              <a:t>3/2/2016</a:t>
             </a:fld>
             <a:endParaRPr lang="en-US"/>
           </a:p>
@@ -5490,7 +5493,7 @@
           <a:p>
             <a:fld id="{FF632088-7E42-4B13-8645-6CA4616862AF}" type="datetimeFigureOut">
               <a:rPr lang="en-US" smtClean="0"/>
-              <a:t>2/22/2016</a:t>
+              <a:t>3/2/2016</a:t>
             </a:fld>
             <a:endParaRPr lang="en-US"/>
           </a:p>
@@ -5866,7 +5869,7 @@
   </p:txStyles>
   <p:extLst>
     <p:ext uri="{27BBF7A9-308A-43DC-89C8-2F10F3537804}">
-      <p15:sldGuideLst xmlns:p15="http://schemas.microsoft.com/office/powerpoint/2012/main" xmlns=""/>
+      <p15:sldGuideLst xmlns="" xmlns:p15="http://schemas.microsoft.com/office/powerpoint/2012/main"/>
     </p:ext>
   </p:extLst>
 </p:sldMaster>
@@ -6095,7 +6098,7 @@
           <a:p>
             <a:fld id="{FF632088-7E42-4B13-8645-6CA4616862AF}" type="datetimeFigureOut">
               <a:rPr lang="en-US" smtClean="0"/>
-              <a:t>2/22/2016</a:t>
+              <a:t>3/2/2016</a:t>
             </a:fld>
             <a:endParaRPr lang="en-US"/>
           </a:p>
@@ -6563,7 +6566,7 @@
   </p:txStyles>
   <p:extLst>
     <p:ext uri="{27BBF7A9-308A-43DC-89C8-2F10F3537804}">
-      <p15:sldGuideLst xmlns:p15="http://schemas.microsoft.com/office/powerpoint/2012/main" xmlns=""/>
+      <p15:sldGuideLst xmlns="" xmlns:p15="http://schemas.microsoft.com/office/powerpoint/2012/main"/>
     </p:ext>
   </p:extLst>
 </p:sldMaster>
@@ -6601,7 +6604,11 @@
           <a:bodyPr/>
           <a:lstStyle/>
           <a:p>
-            <a:endParaRPr lang="en-US"/>
+            <a:r>
+              <a:rPr lang="en-US" dirty="0" smtClean="0"/>
+              <a:t>Claims &amp; Claim Lines</a:t>
+            </a:r>
+            <a:endParaRPr lang="en-US" dirty="0"/>
           </a:p>
         </p:txBody>
       </p:sp>
@@ -6700,6 +6707,214 @@
     <p:extLst>
       <p:ext uri="{BB962C8B-B14F-4D97-AF65-F5344CB8AC3E}">
         <p14:creationId xmlns:p14="http://schemas.microsoft.com/office/powerpoint/2010/main" val="3205627481"/>
+      </p:ext>
+    </p:extLst>
+  </p:cSld>
+  <p:clrMapOvr>
+    <a:masterClrMapping/>
+  </p:clrMapOvr>
+</p:sld>
+</file>
+
+<file path=ppt/slides/slide3.xml><?xml version="1.0" encoding="utf-8"?>
+<p:sld xmlns:a="http://schemas.openxmlformats.org/drawingml/2006/main" xmlns:r="http://schemas.openxmlformats.org/officeDocument/2006/relationships" xmlns:p="http://schemas.openxmlformats.org/presentationml/2006/main">
+  <p:cSld>
+    <p:spTree>
+      <p:nvGrpSpPr>
+        <p:cNvPr id="1" name=""/>
+        <p:cNvGrpSpPr/>
+        <p:nvPr/>
+      </p:nvGrpSpPr>
+      <p:grpSpPr>
+        <a:xfrm>
+          <a:off x="0" y="0"/>
+          <a:ext cx="0" cy="0"/>
+          <a:chOff x="0" y="0"/>
+          <a:chExt cx="0" cy="0"/>
+        </a:xfrm>
+      </p:grpSpPr>
+      <p:sp>
+        <p:nvSpPr>
+          <p:cNvPr id="2" name="Title 1"/>
+          <p:cNvSpPr>
+            <a:spLocks noGrp="1"/>
+          </p:cNvSpPr>
+          <p:nvPr>
+            <p:ph type="title"/>
+          </p:nvPr>
+        </p:nvSpPr>
+        <p:spPr/>
+        <p:txBody>
+          <a:bodyPr/>
+          <a:lstStyle/>
+          <a:p>
+            <a:endParaRPr lang="en-US"/>
+          </a:p>
+        </p:txBody>
+      </p:sp>
+      <p:sp>
+        <p:nvSpPr>
+          <p:cNvPr id="3" name="Content Placeholder 2"/>
+          <p:cNvSpPr>
+            <a:spLocks noGrp="1"/>
+          </p:cNvSpPr>
+          <p:nvPr>
+            <p:ph idx="1"/>
+          </p:nvPr>
+        </p:nvSpPr>
+        <p:spPr/>
+        <p:txBody>
+          <a:bodyPr/>
+          <a:lstStyle/>
+          <a:p>
+            <a:endParaRPr lang="en-US" dirty="0"/>
+          </a:p>
+        </p:txBody>
+      </p:sp>
+    </p:spTree>
+    <p:extLst>
+      <p:ext uri="{BB962C8B-B14F-4D97-AF65-F5344CB8AC3E}">
+        <p14:creationId xmlns:p14="http://schemas.microsoft.com/office/powerpoint/2010/main" val="1932102416"/>
+      </p:ext>
+    </p:extLst>
+  </p:cSld>
+  <p:clrMapOvr>
+    <a:masterClrMapping/>
+  </p:clrMapOvr>
+</p:sld>
+</file>
+
+<file path=ppt/slides/slide4.xml><?xml version="1.0" encoding="utf-8"?>
+<p:sld xmlns:a="http://schemas.openxmlformats.org/drawingml/2006/main" xmlns:r="http://schemas.openxmlformats.org/officeDocument/2006/relationships" xmlns:p="http://schemas.openxmlformats.org/presentationml/2006/main">
+  <p:cSld>
+    <p:spTree>
+      <p:nvGrpSpPr>
+        <p:cNvPr id="1" name=""/>
+        <p:cNvGrpSpPr/>
+        <p:nvPr/>
+      </p:nvGrpSpPr>
+      <p:grpSpPr>
+        <a:xfrm>
+          <a:off x="0" y="0"/>
+          <a:ext cx="0" cy="0"/>
+          <a:chOff x="0" y="0"/>
+          <a:chExt cx="0" cy="0"/>
+        </a:xfrm>
+      </p:grpSpPr>
+      <p:sp>
+        <p:nvSpPr>
+          <p:cNvPr id="2" name="Title 1"/>
+          <p:cNvSpPr>
+            <a:spLocks noGrp="1"/>
+          </p:cNvSpPr>
+          <p:nvPr>
+            <p:ph type="title"/>
+          </p:nvPr>
+        </p:nvSpPr>
+        <p:spPr/>
+        <p:txBody>
+          <a:bodyPr/>
+          <a:lstStyle/>
+          <a:p>
+            <a:endParaRPr lang="en-US"/>
+          </a:p>
+        </p:txBody>
+      </p:sp>
+      <p:sp>
+        <p:nvSpPr>
+          <p:cNvPr id="3" name="Content Placeholder 2"/>
+          <p:cNvSpPr>
+            <a:spLocks noGrp="1"/>
+          </p:cNvSpPr>
+          <p:nvPr>
+            <p:ph idx="1"/>
+          </p:nvPr>
+        </p:nvSpPr>
+        <p:spPr/>
+        <p:txBody>
+          <a:bodyPr/>
+          <a:lstStyle/>
+          <a:p>
+            <a:endParaRPr lang="en-US" dirty="0"/>
+          </a:p>
+        </p:txBody>
+      </p:sp>
+    </p:spTree>
+    <p:extLst>
+      <p:ext uri="{BB962C8B-B14F-4D97-AF65-F5344CB8AC3E}">
+        <p14:creationId xmlns:p14="http://schemas.microsoft.com/office/powerpoint/2010/main" val="1932102416"/>
+      </p:ext>
+    </p:extLst>
+  </p:cSld>
+  <p:clrMapOvr>
+    <a:masterClrMapping/>
+  </p:clrMapOvr>
+</p:sld>
+</file>
+
+<file path=ppt/slides/slide5.xml><?xml version="1.0" encoding="utf-8"?>
+<p:sld xmlns:a="http://schemas.openxmlformats.org/drawingml/2006/main" xmlns:r="http://schemas.openxmlformats.org/officeDocument/2006/relationships" xmlns:p="http://schemas.openxmlformats.org/presentationml/2006/main">
+  <p:cSld>
+    <p:spTree>
+      <p:nvGrpSpPr>
+        <p:cNvPr id="1" name=""/>
+        <p:cNvGrpSpPr/>
+        <p:nvPr/>
+      </p:nvGrpSpPr>
+      <p:grpSpPr>
+        <a:xfrm>
+          <a:off x="0" y="0"/>
+          <a:ext cx="0" cy="0"/>
+          <a:chOff x="0" y="0"/>
+          <a:chExt cx="0" cy="0"/>
+        </a:xfrm>
+      </p:grpSpPr>
+      <p:sp>
+        <p:nvSpPr>
+          <p:cNvPr id="2" name="Title 1"/>
+          <p:cNvSpPr>
+            <a:spLocks noGrp="1"/>
+          </p:cNvSpPr>
+          <p:nvPr>
+            <p:ph type="title"/>
+          </p:nvPr>
+        </p:nvSpPr>
+        <p:spPr/>
+        <p:txBody>
+          <a:bodyPr/>
+          <a:lstStyle/>
+          <a:p>
+            <a:r>
+              <a:rPr lang="en-US" smtClean="0"/>
+              <a:t>References</a:t>
+            </a:r>
+            <a:endParaRPr lang="en-US"/>
+          </a:p>
+        </p:txBody>
+      </p:sp>
+      <p:sp>
+        <p:nvSpPr>
+          <p:cNvPr id="3" name="Content Placeholder 2"/>
+          <p:cNvSpPr>
+            <a:spLocks noGrp="1"/>
+          </p:cNvSpPr>
+          <p:nvPr>
+            <p:ph idx="1"/>
+          </p:nvPr>
+        </p:nvSpPr>
+        <p:spPr/>
+        <p:txBody>
+          <a:bodyPr/>
+          <a:lstStyle/>
+          <a:p>
+            <a:endParaRPr lang="en-US" dirty="0"/>
+          </a:p>
+        </p:txBody>
+      </p:sp>
+    </p:spTree>
+    <p:extLst>
+      <p:ext uri="{BB962C8B-B14F-4D97-AF65-F5344CB8AC3E}">
+        <p14:creationId xmlns:p14="http://schemas.microsoft.com/office/powerpoint/2010/main" val="1932102416"/>
       </p:ext>
     </p:extLst>
   </p:cSld>
@@ -7209,7 +7424,7 @@
   <a:extraClrSchemeLst/>
   <a:extLst>
     <a:ext uri="{05A4C25C-085E-4340-85A3-A5531E510DB2}">
-      <thm15:themeFamily xmlns:thm15="http://schemas.microsoft.com/office/thememl/2012/main" xmlns="" name="Gallery" id="{BBFCD31E-59A1-489D-B089-A3EAD7CAE12E}" vid="{AC464412-510E-4F2B-8947-A0DDBD028997}"/>
+      <thm15:themeFamily xmlns="" xmlns:thm15="http://schemas.microsoft.com/office/thememl/2012/main" name="Gallery" id="{BBFCD31E-59A1-489D-B089-A3EAD7CAE12E}" vid="{AC464412-510E-4F2B-8947-A0DDBD028997}"/>
     </a:ext>
   </a:extLst>
 </a:theme>

</xml_diff>